<commit_message>
Adding git client section
</commit_message>
<xml_diff>
--- a/GitHub.pptx
+++ b/GitHub.pptx
@@ -422,7 +422,7 @@
     </p:spTree>
     <p:extLst>
       <p:ext uri="{BB962C8B-B14F-4D97-AF65-F5344CB8AC3E}">
-        <p14:creationId xmlns:p14="http://schemas.microsoft.com/office/powerpoint/2010/main" xmlns="" val="486385863"/>
+        <p14:creationId xmlns="" xmlns:p14="http://schemas.microsoft.com/office/powerpoint/2010/main" val="486385863"/>
       </p:ext>
     </p:extLst>
   </p:cSld>
@@ -3066,11 +3066,7 @@
           <a:p>
             <a:r>
               <a:rPr lang="en-US" dirty="0" smtClean="0"/>
-              <a:t>For this tutorial, we’ll be using </a:t>
-            </a:r>
-            <a:r>
-              <a:rPr lang="en-US" dirty="0" smtClean="0"/>
-              <a:t>the </a:t>
+              <a:t>For this tutorial, we’ll be using the </a:t>
             </a:r>
             <a:r>
               <a:rPr lang="en-US" dirty="0" err="1" smtClean="0"/>
@@ -3100,11 +3096,7 @@
             </a:r>
             <a:r>
               <a:rPr lang="en-US" b="1" dirty="0" smtClean="0"/>
-              <a:t> </a:t>
-            </a:r>
-            <a:r>
-              <a:rPr lang="en-US" b="1" dirty="0" smtClean="0"/>
-              <a:t>” repo</a:t>
+              <a:t> ” repo</a:t>
             </a:r>
             <a:endParaRPr lang="en-US" dirty="0" smtClean="0"/>
           </a:p>
@@ -3131,7 +3123,19 @@
           <a:p>
             <a:r>
               <a:rPr lang="en-US" dirty="0" smtClean="0"/>
-              <a:t>You’ve successfully forked the Spoon-Knife repo, but so far it only exists on </a:t>
+              <a:t>You’ve successfully forked the </a:t>
+            </a:r>
+            <a:r>
+              <a:rPr lang="en-US" dirty="0" err="1" smtClean="0"/>
+              <a:t>Scrumdo</a:t>
+            </a:r>
+            <a:r>
+              <a:rPr lang="en-US" dirty="0" smtClean="0"/>
+              <a:t> </a:t>
+            </a:r>
+            <a:r>
+              <a:rPr lang="en-US" dirty="0" smtClean="0"/>
+              <a:t>repo, but so far it only exists on </a:t>
             </a:r>
             <a:r>
               <a:rPr lang="en-US" dirty="0" err="1" smtClean="0"/>
@@ -3196,6 +3200,67 @@
                 <a:sym typeface="Wingdings 3"/>
               </a:rPr>
               <a:t>/Scrumdo.git</a:t>
+            </a:r>
+          </a:p>
+          <a:p>
+            <a:endParaRPr lang="en-US" dirty="0" smtClean="0"/>
+          </a:p>
+          <a:p>
+            <a:r>
+              <a:rPr lang="en-US" b="1" dirty="0" smtClean="0"/>
+              <a:t>Step 2B: Configure remotes</a:t>
+            </a:r>
+            <a:endParaRPr lang="en-US" dirty="0" smtClean="0"/>
+          </a:p>
+          <a:p>
+            <a:r>
+              <a:rPr lang="en-US" dirty="0" smtClean="0"/>
+              <a:t>When a repo is cloned, it has a default remote called origin that points to your fork on </a:t>
+            </a:r>
+            <a:r>
+              <a:rPr lang="en-US" dirty="0" err="1" smtClean="0"/>
+              <a:t>GitHub</a:t>
+            </a:r>
+            <a:r>
+              <a:rPr lang="en-US" dirty="0" smtClean="0"/>
+              <a:t>, not the original repo it was forked from. To keep track of the original repo, you need to add another remote named upstream:</a:t>
+            </a:r>
+          </a:p>
+          <a:p>
+            <a:endParaRPr lang="en-US" dirty="0" smtClean="0"/>
+          </a:p>
+          <a:p>
+            <a:r>
+              <a:rPr lang="en-US" sz="1100" dirty="0" smtClean="0">
+                <a:latin typeface="Courier New" pitchFamily="49" charset="0"/>
+                <a:cs typeface="Courier New" pitchFamily="49" charset="0"/>
+                <a:sym typeface="Wingdings 3"/>
+              </a:rPr>
+              <a:t>$ </a:t>
+            </a:r>
+            <a:r>
+              <a:rPr lang="en-US" sz="1100" dirty="0" err="1" smtClean="0">
+                <a:latin typeface="Courier New" pitchFamily="49" charset="0"/>
+                <a:cs typeface="Courier New" pitchFamily="49" charset="0"/>
+                <a:sym typeface="Wingdings 3"/>
+              </a:rPr>
+              <a:t>cd</a:t>
+            </a:r>
+            <a:r>
+              <a:rPr lang="en-US" sz="1100" dirty="0" smtClean="0">
+                <a:latin typeface="Courier New" pitchFamily="49" charset="0"/>
+                <a:cs typeface="Courier New" pitchFamily="49" charset="0"/>
+                <a:sym typeface="Wingdings 3"/>
+              </a:rPr>
+              <a:t> </a:t>
+            </a:r>
+            <a:r>
+              <a:rPr lang="en-US" sz="1100" dirty="0" err="1" smtClean="0">
+                <a:latin typeface="Courier New" pitchFamily="49" charset="0"/>
+                <a:cs typeface="Courier New" pitchFamily="49" charset="0"/>
+                <a:sym typeface="Wingdings 3"/>
+              </a:rPr>
+              <a:t>Scrumdo</a:t>
             </a:r>
             <a:endParaRPr lang="en-US" sz="1100" dirty="0" smtClean="0">
               <a:latin typeface="Courier New" pitchFamily="49" charset="0"/>
@@ -3204,33 +3269,6 @@
             </a:endParaRPr>
           </a:p>
           <a:p>
-            <a:endParaRPr lang="en-US" dirty="0" smtClean="0"/>
-          </a:p>
-          <a:p>
-            <a:r>
-              <a:rPr lang="en-US" b="1" dirty="0" smtClean="0"/>
-              <a:t>Step 2B: Configure remotes</a:t>
-            </a:r>
-            <a:endParaRPr lang="en-US" dirty="0" smtClean="0"/>
-          </a:p>
-          <a:p>
-            <a:r>
-              <a:rPr lang="en-US" dirty="0" smtClean="0"/>
-              <a:t>When a repo is cloned, it has a default remote called origin that points to your fork on </a:t>
-            </a:r>
-            <a:r>
-              <a:rPr lang="en-US" dirty="0" err="1" smtClean="0"/>
-              <a:t>GitHub</a:t>
-            </a:r>
-            <a:r>
-              <a:rPr lang="en-US" dirty="0" smtClean="0"/>
-              <a:t>, not the original repo it was forked from. To keep track of the original repo, you need to add another remote named upstream:</a:t>
-            </a:r>
-          </a:p>
-          <a:p>
-            <a:endParaRPr lang="en-US" dirty="0" smtClean="0"/>
-          </a:p>
-          <a:p>
             <a:r>
               <a:rPr lang="en-US" sz="1100" dirty="0" smtClean="0">
                 <a:latin typeface="Courier New" pitchFamily="49" charset="0"/>
@@ -3245,7 +3283,7 @@
                 <a:cs typeface="Courier New" pitchFamily="49" charset="0"/>
                 <a:sym typeface="Wingdings 3"/>
               </a:rPr>
-              <a:t>cd</a:t>
+              <a:t>git</a:t>
             </a:r>
             <a:r>
               <a:rPr lang="en-US" sz="1100" dirty="0" smtClean="0">
@@ -3253,60 +3291,8 @@
                 <a:cs typeface="Courier New" pitchFamily="49" charset="0"/>
                 <a:sym typeface="Wingdings 3"/>
               </a:rPr>
-              <a:t> </a:t>
-            </a:r>
-            <a:r>
-              <a:rPr lang="en-US" sz="1100" dirty="0" err="1" smtClean="0">
-                <a:latin typeface="Courier New" pitchFamily="49" charset="0"/>
-                <a:cs typeface="Courier New" pitchFamily="49" charset="0"/>
-                <a:sym typeface="Wingdings 3"/>
-              </a:rPr>
-              <a:t>Scrumdo</a:t>
-            </a:r>
-            <a:endParaRPr lang="en-US" sz="1100" dirty="0" smtClean="0">
-              <a:latin typeface="Courier New" pitchFamily="49" charset="0"/>
-              <a:cs typeface="Courier New" pitchFamily="49" charset="0"/>
-              <a:sym typeface="Wingdings 3"/>
-            </a:endParaRPr>
-          </a:p>
-          <a:p>
-            <a:r>
-              <a:rPr lang="en-US" sz="1100" dirty="0" smtClean="0">
-                <a:latin typeface="Courier New" pitchFamily="49" charset="0"/>
-                <a:cs typeface="Courier New" pitchFamily="49" charset="0"/>
-                <a:sym typeface="Wingdings 3"/>
-              </a:rPr>
-              <a:t>$ </a:t>
-            </a:r>
-            <a:r>
-              <a:rPr lang="en-US" sz="1100" dirty="0" err="1" smtClean="0">
-                <a:latin typeface="Courier New" pitchFamily="49" charset="0"/>
-                <a:cs typeface="Courier New" pitchFamily="49" charset="0"/>
-                <a:sym typeface="Wingdings 3"/>
-              </a:rPr>
-              <a:t>git</a:t>
-            </a:r>
-            <a:r>
-              <a:rPr lang="en-US" sz="1100" dirty="0" smtClean="0">
-                <a:latin typeface="Courier New" pitchFamily="49" charset="0"/>
-                <a:cs typeface="Courier New" pitchFamily="49" charset="0"/>
-                <a:sym typeface="Wingdings 3"/>
-              </a:rPr>
-              <a:t> remote add upstream </a:t>
-            </a:r>
-            <a:r>
-              <a:rPr lang="en-US" sz="1100" dirty="0" smtClean="0">
-                <a:latin typeface="Courier New" pitchFamily="49" charset="0"/>
-                <a:cs typeface="Courier New" pitchFamily="49" charset="0"/>
-                <a:sym typeface="Wingdings 3"/>
-              </a:rPr>
-              <a:t>git://github.com/ScrumDoLLC/ScrumDo.git</a:t>
-            </a:r>
-            <a:endParaRPr lang="en-US" sz="1100" dirty="0" smtClean="0">
-              <a:latin typeface="Courier New" pitchFamily="49" charset="0"/>
-              <a:cs typeface="Courier New" pitchFamily="49" charset="0"/>
-              <a:sym typeface="Wingdings 3"/>
-            </a:endParaRPr>
+              <a:t> remote add upstream git://github.com/ScrumDoLLC/ScrumDo.git</a:t>
+            </a:r>
           </a:p>
           <a:p>
             <a:r>
@@ -4927,7 +4913,7 @@
     </p:spTree>
     <p:extLst>
       <p:ext uri="{BB962C8B-B14F-4D97-AF65-F5344CB8AC3E}">
-        <p14:creationId xmlns:p14="http://schemas.microsoft.com/office/powerpoint/2010/main" xmlns="" val="1343535215"/>
+        <p14:creationId xmlns="" xmlns:p14="http://schemas.microsoft.com/office/powerpoint/2010/main" val="1343535215"/>
       </p:ext>
     </p:extLst>
   </p:cSld>
@@ -7673,7 +7659,7 @@
         <p:spPr bwMode="auto">
           <a:xfrm>
             <a:off x="4131708" y="4005064"/>
-            <a:ext cx="5004048" cy="1594622"/>
+            <a:ext cx="5004048" cy="2210175"/>
           </a:xfrm>
           <a:prstGeom prst="rect">
             <a:avLst/>
@@ -7755,8 +7741,55 @@
                 </a:solidFill>
                 <a:latin typeface="Verdana" pitchFamily="34" charset="0"/>
               </a:rPr>
-              <a:t> and the CG team</a:t>
-            </a:r>
+              <a:t> and the CG </a:t>
+            </a:r>
+            <a:r>
+              <a:rPr lang="fr-FR" sz="2000" b="1" i="1" dirty="0" smtClean="0">
+                <a:solidFill>
+                  <a:srgbClr val="486DA2"/>
+                </a:solidFill>
+                <a:latin typeface="Verdana" pitchFamily="34" charset="0"/>
+              </a:rPr>
+              <a:t>team</a:t>
+            </a:r>
+          </a:p>
+          <a:p>
+            <a:pPr algn="ctr"/>
+            <a:r>
+              <a:rPr lang="fr-FR" sz="2000" b="1" i="1" dirty="0" smtClean="0">
+                <a:solidFill>
+                  <a:srgbClr val="486DA2"/>
+                </a:solidFill>
+                <a:latin typeface="Verdana" pitchFamily="34" charset="0"/>
+                <a:hlinkClick r:id="rId4"/>
+              </a:rPr>
+              <a:t>http://</a:t>
+            </a:r>
+            <a:r>
+              <a:rPr lang="fr-FR" sz="2000" b="1" i="1" dirty="0" smtClean="0">
+                <a:solidFill>
+                  <a:srgbClr val="486DA2"/>
+                </a:solidFill>
+                <a:latin typeface="Verdana" pitchFamily="34" charset="0"/>
+                <a:hlinkClick r:id="rId4"/>
+              </a:rPr>
+              <a:t>bit.ly/setupgit</a:t>
+            </a:r>
+            <a:endParaRPr lang="fr-FR" sz="2000" b="1" i="1" dirty="0" smtClean="0">
+              <a:solidFill>
+                <a:srgbClr val="486DA2"/>
+              </a:solidFill>
+              <a:latin typeface="Verdana" pitchFamily="34" charset="0"/>
+            </a:endParaRPr>
+          </a:p>
+          <a:p>
+            <a:pPr algn="ctr"/>
+            <a:endParaRPr lang="fr-FR" sz="2000" b="1" i="1" dirty="0" smtClean="0">
+              <a:solidFill>
+                <a:srgbClr val="486DA2"/>
+              </a:solidFill>
+              <a:latin typeface="Verdana" pitchFamily="34" charset="0"/>
+            </a:endParaRPr>
           </a:p>
           <a:p>
             <a:pPr algn="ctr"/>
@@ -7771,32 +7804,6 @@
       <p:pic>
         <p:nvPicPr>
           <p:cNvPr id="2075" name="Picture 27" descr="octocat.png (512×512)"/>
-          <p:cNvPicPr>
-            <a:picLocks noChangeAspect="1" noChangeArrowheads="1"/>
-          </p:cNvPicPr>
-          <p:nvPr/>
-        </p:nvPicPr>
-        <p:blipFill>
-          <a:blip r:embed="rId4" cstate="print"/>
-          <a:srcRect/>
-          <a:stretch>
-            <a:fillRect/>
-          </a:stretch>
-        </p:blipFill>
-        <p:spPr bwMode="auto">
-          <a:xfrm>
-            <a:off x="35496" y="1772816"/>
-            <a:ext cx="3240360" cy="3240361"/>
-          </a:xfrm>
-          <a:prstGeom prst="rect">
-            <a:avLst/>
-          </a:prstGeom>
-          <a:noFill/>
-        </p:spPr>
-      </p:pic>
-      <p:pic>
-        <p:nvPicPr>
-          <p:cNvPr id="6" name="Picture 15" descr="http://www.camilleroux.com/wp-content/uploads/2010/10/github_logo.png?119d5e"/>
           <p:cNvPicPr>
             <a:picLocks noChangeAspect="1" noChangeArrowheads="1"/>
           </p:cNvPicPr>
@@ -7811,8 +7818,8 @@
         </p:blipFill>
         <p:spPr bwMode="auto">
           <a:xfrm>
-            <a:off x="3812887" y="2276872"/>
-            <a:ext cx="5313956" cy="1656184"/>
+            <a:off x="35496" y="1772816"/>
+            <a:ext cx="3240360" cy="3240361"/>
           </a:xfrm>
           <a:prstGeom prst="rect">
             <a:avLst/>
@@ -7822,7 +7829,7 @@
       </p:pic>
       <p:pic>
         <p:nvPicPr>
-          <p:cNvPr id="7" name="Picture 2"/>
+          <p:cNvPr id="6" name="Picture 15" descr="http://www.camilleroux.com/wp-content/uploads/2010/10/github_logo.png?119d5e"/>
           <p:cNvPicPr>
             <a:picLocks noChangeAspect="1" noChangeArrowheads="1"/>
           </p:cNvPicPr>
@@ -7837,6 +7844,32 @@
         </p:blipFill>
         <p:spPr bwMode="auto">
           <a:xfrm>
+            <a:off x="3812887" y="2276872"/>
+            <a:ext cx="5313956" cy="1656184"/>
+          </a:xfrm>
+          <a:prstGeom prst="rect">
+            <a:avLst/>
+          </a:prstGeom>
+          <a:noFill/>
+        </p:spPr>
+      </p:pic>
+      <p:pic>
+        <p:nvPicPr>
+          <p:cNvPr id="7" name="Picture 2"/>
+          <p:cNvPicPr>
+            <a:picLocks noChangeAspect="1" noChangeArrowheads="1"/>
+          </p:cNvPicPr>
+          <p:nvPr/>
+        </p:nvPicPr>
+        <p:blipFill>
+          <a:blip r:embed="rId7" cstate="print"/>
+          <a:srcRect/>
+          <a:stretch>
+            <a:fillRect/>
+          </a:stretch>
+        </p:blipFill>
+        <p:spPr bwMode="auto">
+          <a:xfrm>
             <a:off x="2627784" y="5805264"/>
             <a:ext cx="3312368" cy="720080"/>
           </a:xfrm>
@@ -7898,10 +7931,10 @@
           <p:nvPr/>
         </p:nvPicPr>
         <p:blipFill>
-          <a:blip r:embed="rId7" cstate="print">
+          <a:blip r:embed="rId8" cstate="print">
             <a:extLst>
               <a:ext uri="{28A0092B-C50C-407E-A947-70E740481C1C}">
-                <a14:useLocalDpi xmlns:a14="http://schemas.microsoft.com/office/drawing/2010/main" xmlns="" val="0"/>
+                <a14:useLocalDpi xmlns="" xmlns:a14="http://schemas.microsoft.com/office/drawing/2010/main" val="0"/>
               </a:ext>
             </a:extLst>
           </a:blip>
@@ -7927,7 +7960,7 @@
         </p:nvSpPr>
         <p:spPr>
           <a:xfrm>
-            <a:off x="2627784" y="5229200"/>
+            <a:off x="2446208" y="5517232"/>
             <a:ext cx="6697792" cy="369332"/>
           </a:xfrm>
           <a:prstGeom prst="rect">
@@ -8924,7 +8957,7 @@
     </p:spTree>
     <p:extLst>
       <p:ext uri="{BB962C8B-B14F-4D97-AF65-F5344CB8AC3E}">
-        <p14:creationId xmlns:p14="http://schemas.microsoft.com/office/powerpoint/2010/main" xmlns="" val="1318206517"/>
+        <p14:creationId xmlns="" xmlns:p14="http://schemas.microsoft.com/office/powerpoint/2010/main" val="1318206517"/>
       </p:ext>
     </p:extLst>
   </p:cSld>
@@ -9105,7 +9138,7 @@
     </p:spTree>
     <p:extLst>
       <p:ext uri="{BB962C8B-B14F-4D97-AF65-F5344CB8AC3E}">
-        <p14:creationId xmlns:p14="http://schemas.microsoft.com/office/powerpoint/2010/main" xmlns="" val="2344691747"/>
+        <p14:creationId xmlns="" xmlns:p14="http://schemas.microsoft.com/office/powerpoint/2010/main" val="2344691747"/>
       </p:ext>
     </p:extLst>
   </p:cSld>
@@ -9160,16 +9193,7 @@
                 </a:solidFill>
                 <a:latin typeface="Verdana" pitchFamily="34" charset="0"/>
               </a:rPr>
-              <a:t>Installer </a:t>
-            </a:r>
-            <a:r>
-              <a:rPr lang="en-US" b="1" dirty="0" smtClean="0">
-                <a:solidFill>
-                  <a:srgbClr val="486DA2"/>
-                </a:solidFill>
-                <a:latin typeface="Verdana" pitchFamily="34" charset="0"/>
-              </a:rPr>
-              <a:t>Platform Assistance:</a:t>
+              <a:t>Installer Platform Assistance:</a:t>
             </a:r>
           </a:p>
           <a:p>
@@ -9180,7 +9204,6 @@
               <a:rPr lang="en-US" b="1" dirty="0" smtClean="0"/>
               <a:t>LINUX</a:t>
             </a:r>
-            <a:endParaRPr lang="en-US" b="1" dirty="0" smtClean="0"/>
           </a:p>
           <a:p>
             <a:r>
@@ -9203,7 +9226,6 @@
               <a:rPr lang="en-US" altLang="ja-JP" dirty="0" smtClean="0"/>
               <a:t>. </a:t>
             </a:r>
-            <a:endParaRPr lang="en-US" altLang="ja-JP" dirty="0" smtClean="0"/>
           </a:p>
           <a:p>
             <a:endParaRPr lang="en-US" sz="1200" dirty="0" smtClean="0"/>
@@ -9221,19 +9243,7 @@
           <a:p>
             <a:r>
               <a:rPr lang="en-US" dirty="0" smtClean="0"/>
-              <a:t>Configure </a:t>
-            </a:r>
-            <a:r>
-              <a:rPr lang="en-US" dirty="0" smtClean="0"/>
-              <a:t>the RPM forge repository </a:t>
-            </a:r>
-            <a:r>
-              <a:rPr lang="en-US" dirty="0" smtClean="0"/>
-              <a:t>by installing </a:t>
-            </a:r>
-            <a:r>
-              <a:rPr lang="en-US" dirty="0" smtClean="0"/>
-              <a:t>the correct </a:t>
+              <a:t>Configure the RPM forge repository by installing the correct </a:t>
             </a:r>
             <a:r>
               <a:rPr lang="en-US" dirty="0" err="1" smtClean="0"/>
@@ -9241,11 +9251,7 @@
             </a:r>
             <a:r>
               <a:rPr lang="en-US" dirty="0" smtClean="0"/>
-              <a:t> RPM </a:t>
-            </a:r>
-            <a:r>
-              <a:rPr lang="en-US" dirty="0" smtClean="0"/>
-              <a:t>from</a:t>
+              <a:t> RPM from</a:t>
             </a:r>
           </a:p>
           <a:p>
@@ -10806,22 +10812,13 @@
               <a:buChar char="•"/>
             </a:pPr>
             <a:r>
-              <a:rPr lang="en-US" b="1" dirty="0" smtClean="0">
-                <a:solidFill>
-                  <a:srgbClr val="486DA2"/>
-                </a:solidFill>
-                <a:latin typeface="Verdana" pitchFamily="34" charset="0"/>
-              </a:rPr>
-              <a:t> </a:t>
-            </a:r>
-            <a:r>
               <a:rPr lang="en-US" sz="2000" b="1" dirty="0" smtClean="0">
                 <a:solidFill>
                   <a:srgbClr val="486DA2"/>
                 </a:solidFill>
                 <a:latin typeface="Verdana" pitchFamily="34" charset="0"/>
               </a:rPr>
-              <a:t>Setup your identity:</a:t>
+              <a:t>Generate SSH keys:</a:t>
             </a:r>
           </a:p>
           <a:p>
@@ -10838,127 +10835,11 @@
           </a:p>
           <a:p>
             <a:r>
-              <a:rPr lang="en-US" sz="1600" dirty="0" smtClean="0">
+              <a:rPr lang="de-DE" sz="1600" dirty="0" smtClean="0">
                 <a:latin typeface="Courier New" pitchFamily="49" charset="0"/>
                 <a:cs typeface="Courier New" pitchFamily="49" charset="0"/>
               </a:rPr>
-              <a:t>$ </a:t>
-            </a:r>
-            <a:r>
-              <a:rPr lang="en-US" sz="1600" dirty="0" err="1" smtClean="0">
-                <a:latin typeface="Courier New" pitchFamily="49" charset="0"/>
-                <a:cs typeface="Courier New" pitchFamily="49" charset="0"/>
-              </a:rPr>
-              <a:t>git</a:t>
-            </a:r>
-            <a:r>
-              <a:rPr lang="en-US" sz="1600" dirty="0" smtClean="0">
-                <a:latin typeface="Courier New" pitchFamily="49" charset="0"/>
-                <a:cs typeface="Courier New" pitchFamily="49" charset="0"/>
-              </a:rPr>
-              <a:t> </a:t>
-            </a:r>
-            <a:r>
-              <a:rPr lang="en-US" sz="1600" dirty="0" err="1" smtClean="0">
-                <a:latin typeface="Courier New" pitchFamily="49" charset="0"/>
-                <a:cs typeface="Courier New" pitchFamily="49" charset="0"/>
-              </a:rPr>
-              <a:t>config</a:t>
-            </a:r>
-            <a:r>
-              <a:rPr lang="en-US" sz="1600" dirty="0" smtClean="0">
-                <a:latin typeface="Courier New" pitchFamily="49" charset="0"/>
-                <a:cs typeface="Courier New" pitchFamily="49" charset="0"/>
-              </a:rPr>
-              <a:t> --global user.name “</a:t>
-            </a:r>
-            <a:r>
-              <a:rPr lang="en-US" sz="1600" dirty="0" err="1" smtClean="0">
-                <a:latin typeface="Courier New" pitchFamily="49" charset="0"/>
-                <a:cs typeface="Courier New" pitchFamily="49" charset="0"/>
-              </a:rPr>
-              <a:t>firstName</a:t>
-            </a:r>
-            <a:r>
-              <a:rPr lang="en-US" sz="1600" dirty="0" smtClean="0">
-                <a:latin typeface="Courier New" pitchFamily="49" charset="0"/>
-                <a:cs typeface="Courier New" pitchFamily="49" charset="0"/>
-              </a:rPr>
-              <a:t> </a:t>
-            </a:r>
-            <a:r>
-              <a:rPr lang="en-US" sz="1600" dirty="0" err="1" smtClean="0">
-                <a:latin typeface="Courier New" pitchFamily="49" charset="0"/>
-                <a:cs typeface="Courier New" pitchFamily="49" charset="0"/>
-              </a:rPr>
-              <a:t>lastName</a:t>
-            </a:r>
-            <a:r>
-              <a:rPr lang="en-US" sz="1600" dirty="0" smtClean="0">
-                <a:latin typeface="Courier New" pitchFamily="49" charset="0"/>
-                <a:cs typeface="Courier New" pitchFamily="49" charset="0"/>
-              </a:rPr>
-              <a:t>“</a:t>
-            </a:r>
-          </a:p>
-          <a:p>
-            <a:r>
-              <a:rPr lang="en-US" sz="1600" dirty="0" smtClean="0">
-                <a:latin typeface="Courier New" pitchFamily="49" charset="0"/>
-                <a:cs typeface="Courier New" pitchFamily="49" charset="0"/>
-              </a:rPr>
-              <a:t> </a:t>
-            </a:r>
-          </a:p>
-          <a:p>
-            <a:r>
-              <a:rPr lang="en-US" sz="1600" dirty="0" smtClean="0">
-                <a:latin typeface="Courier New" pitchFamily="49" charset="0"/>
-                <a:cs typeface="Courier New" pitchFamily="49" charset="0"/>
-              </a:rPr>
-              <a:t>$ </a:t>
-            </a:r>
-            <a:r>
-              <a:rPr lang="en-US" sz="1600" dirty="0" err="1" smtClean="0">
-                <a:latin typeface="Courier New" pitchFamily="49" charset="0"/>
-                <a:cs typeface="Courier New" pitchFamily="49" charset="0"/>
-              </a:rPr>
-              <a:t>git</a:t>
-            </a:r>
-            <a:r>
-              <a:rPr lang="en-US" sz="1600" dirty="0" smtClean="0">
-                <a:latin typeface="Courier New" pitchFamily="49" charset="0"/>
-                <a:cs typeface="Courier New" pitchFamily="49" charset="0"/>
-              </a:rPr>
-              <a:t> </a:t>
-            </a:r>
-            <a:r>
-              <a:rPr lang="en-US" sz="1600" dirty="0" err="1" smtClean="0">
-                <a:latin typeface="Courier New" pitchFamily="49" charset="0"/>
-                <a:cs typeface="Courier New" pitchFamily="49" charset="0"/>
-              </a:rPr>
-              <a:t>config</a:t>
-            </a:r>
-            <a:r>
-              <a:rPr lang="en-US" sz="1600" dirty="0" smtClean="0">
-                <a:latin typeface="Courier New" pitchFamily="49" charset="0"/>
-                <a:cs typeface="Courier New" pitchFamily="49" charset="0"/>
-              </a:rPr>
-              <a:t> --global </a:t>
-            </a:r>
-            <a:r>
-              <a:rPr lang="en-US" sz="1600" dirty="0" err="1" smtClean="0">
-                <a:latin typeface="Courier New" pitchFamily="49" charset="0"/>
-                <a:cs typeface="Courier New" pitchFamily="49" charset="0"/>
-              </a:rPr>
-              <a:t>user.email</a:t>
-            </a:r>
-            <a:r>
-              <a:rPr lang="en-US" sz="1600" dirty="0" smtClean="0">
-                <a:latin typeface="Courier New" pitchFamily="49" charset="0"/>
-                <a:cs typeface="Courier New" pitchFamily="49" charset="0"/>
-              </a:rPr>
-              <a:t> </a:t>
+              <a:t>$ ssh-keygen -t rsa –C “ </a:t>
             </a:r>
             <a:r>
               <a:rPr lang="en-US" sz="1600" dirty="0" smtClean="0">
@@ -10968,16 +10849,56 @@
               </a:rPr>
               <a:t>userName@example.com</a:t>
             </a:r>
-            <a:endParaRPr lang="en-US" sz="1600" dirty="0" smtClean="0">
-              <a:latin typeface="Courier New" pitchFamily="49" charset="0"/>
-              <a:cs typeface="Courier New" pitchFamily="49" charset="0"/>
-            </a:endParaRPr>
-          </a:p>
-          <a:p>
+            <a:r>
+              <a:rPr lang="en-US" sz="1600" dirty="0" smtClean="0">
+                <a:latin typeface="Courier New" pitchFamily="49" charset="0"/>
+                <a:cs typeface="Courier New" pitchFamily="49" charset="0"/>
+              </a:rPr>
+              <a:t> </a:t>
+            </a:r>
+            <a:r>
+              <a:rPr lang="de-DE" sz="1600" dirty="0" smtClean="0">
+                <a:latin typeface="Courier New" pitchFamily="49" charset="0"/>
+                <a:cs typeface="Courier New" pitchFamily="49" charset="0"/>
+              </a:rPr>
+              <a:t>" </a:t>
+            </a:r>
+            <a:r>
+              <a:rPr lang="de-DE" sz="1600" dirty="0" smtClean="0">
+                <a:latin typeface="Courier New" pitchFamily="49" charset="0"/>
+                <a:cs typeface="Courier New" pitchFamily="49" charset="0"/>
+                <a:sym typeface="Wingdings 3"/>
+              </a:rPr>
+              <a:t>  </a:t>
+            </a:r>
             <a:endParaRPr lang="en-US" dirty="0" smtClean="0"/>
           </a:p>
           <a:p>
             <a:endParaRPr lang="en-US" dirty="0" smtClean="0"/>
+          </a:p>
+          <a:p>
+            <a:r>
+              <a:rPr lang="en-US" dirty="0" smtClean="0"/>
+              <a:t>(Press ‘Enter’ key thrice to skip the passphrase questions</a:t>
+            </a:r>
+            <a:r>
+              <a:rPr lang="en-US" dirty="0" smtClean="0"/>
+              <a:t>)</a:t>
+            </a:r>
+          </a:p>
+          <a:p>
+            <a:endParaRPr lang="en-US" dirty="0" smtClean="0"/>
+          </a:p>
+          <a:p>
+            <a:r>
+              <a:rPr lang="en-US" b="1" dirty="0" smtClean="0">
+                <a:solidFill>
+                  <a:srgbClr val="486DA2"/>
+                </a:solidFill>
+                <a:latin typeface="Verdana" pitchFamily="34" charset="0"/>
+              </a:rPr>
+              <a:t> </a:t>
+            </a:r>
           </a:p>
           <a:p>
             <a:pPr>
@@ -10991,7 +10912,16 @@
                 </a:solidFill>
                 <a:latin typeface="Verdana" pitchFamily="34" charset="0"/>
               </a:rPr>
-              <a:t> Generate SSH keys:</a:t>
+              <a:t>Setup </a:t>
+            </a:r>
+            <a:r>
+              <a:rPr lang="en-US" sz="2000" b="1" dirty="0" smtClean="0">
+                <a:solidFill>
+                  <a:srgbClr val="486DA2"/>
+                </a:solidFill>
+                <a:latin typeface="Verdana" pitchFamily="34" charset="0"/>
+              </a:rPr>
+              <a:t>your identity:</a:t>
             </a:r>
           </a:p>
           <a:p>
@@ -11008,32 +10938,127 @@
           </a:p>
           <a:p>
             <a:r>
-              <a:rPr lang="de-DE" sz="1600" dirty="0">
+              <a:rPr lang="en-US" sz="1600" dirty="0" smtClean="0">
                 <a:latin typeface="Courier New" pitchFamily="49" charset="0"/>
                 <a:cs typeface="Courier New" pitchFamily="49" charset="0"/>
               </a:rPr>
               <a:t>$ </a:t>
             </a:r>
             <a:r>
-              <a:rPr lang="de-DE" sz="1600" dirty="0" smtClean="0">
+              <a:rPr lang="en-US" sz="1600" dirty="0" err="1" smtClean="0">
                 <a:latin typeface="Courier New" pitchFamily="49" charset="0"/>
                 <a:cs typeface="Courier New" pitchFamily="49" charset="0"/>
               </a:rPr>
-              <a:t>ssh-keygen </a:t>
-            </a:r>
-            <a:r>
-              <a:rPr lang="de-DE" sz="1600" dirty="0">
+              <a:t>git</a:t>
+            </a:r>
+            <a:r>
+              <a:rPr lang="en-US" sz="1600" dirty="0" smtClean="0">
                 <a:latin typeface="Courier New" pitchFamily="49" charset="0"/>
                 <a:cs typeface="Courier New" pitchFamily="49" charset="0"/>
               </a:rPr>
-              <a:t>-t rsa </a:t>
-            </a:r>
-            <a:r>
-              <a:rPr lang="de-DE" sz="1600" dirty="0" smtClean="0">
+              <a:t> </a:t>
+            </a:r>
+            <a:r>
+              <a:rPr lang="en-US" sz="1600" dirty="0" err="1" smtClean="0">
                 <a:latin typeface="Courier New" pitchFamily="49" charset="0"/>
                 <a:cs typeface="Courier New" pitchFamily="49" charset="0"/>
               </a:rPr>
-              <a:t>–C “ </a:t>
+              <a:t>config</a:t>
+            </a:r>
+            <a:r>
+              <a:rPr lang="en-US" sz="1600" dirty="0" smtClean="0">
+                <a:latin typeface="Courier New" pitchFamily="49" charset="0"/>
+                <a:cs typeface="Courier New" pitchFamily="49" charset="0"/>
+              </a:rPr>
+              <a:t> --global user.name “</a:t>
+            </a:r>
+            <a:r>
+              <a:rPr lang="en-US" sz="1600" dirty="0" err="1" smtClean="0">
+                <a:latin typeface="Courier New" pitchFamily="49" charset="0"/>
+                <a:cs typeface="Courier New" pitchFamily="49" charset="0"/>
+              </a:rPr>
+              <a:t>firstName</a:t>
+            </a:r>
+            <a:r>
+              <a:rPr lang="en-US" sz="1600" dirty="0" smtClean="0">
+                <a:latin typeface="Courier New" pitchFamily="49" charset="0"/>
+                <a:cs typeface="Courier New" pitchFamily="49" charset="0"/>
+              </a:rPr>
+              <a:t> </a:t>
+            </a:r>
+            <a:r>
+              <a:rPr lang="en-US" sz="1600" dirty="0" err="1" smtClean="0">
+                <a:latin typeface="Courier New" pitchFamily="49" charset="0"/>
+                <a:cs typeface="Courier New" pitchFamily="49" charset="0"/>
+              </a:rPr>
+              <a:t>lastName</a:t>
+            </a:r>
+            <a:r>
+              <a:rPr lang="en-US" sz="1600" dirty="0" smtClean="0">
+                <a:latin typeface="Courier New" pitchFamily="49" charset="0"/>
+                <a:cs typeface="Courier New" pitchFamily="49" charset="0"/>
+              </a:rPr>
+              <a:t>“</a:t>
+            </a:r>
+          </a:p>
+          <a:p>
+            <a:r>
+              <a:rPr lang="en-US" sz="1600" dirty="0" smtClean="0">
+                <a:latin typeface="Courier New" pitchFamily="49" charset="0"/>
+                <a:cs typeface="Courier New" pitchFamily="49" charset="0"/>
+              </a:rPr>
+              <a:t> </a:t>
+            </a:r>
+          </a:p>
+          <a:p>
+            <a:r>
+              <a:rPr lang="en-US" sz="1600" dirty="0" smtClean="0">
+                <a:latin typeface="Courier New" pitchFamily="49" charset="0"/>
+                <a:cs typeface="Courier New" pitchFamily="49" charset="0"/>
+              </a:rPr>
+              <a:t>$ </a:t>
+            </a:r>
+            <a:r>
+              <a:rPr lang="en-US" sz="1600" dirty="0" err="1" smtClean="0">
+                <a:latin typeface="Courier New" pitchFamily="49" charset="0"/>
+                <a:cs typeface="Courier New" pitchFamily="49" charset="0"/>
+              </a:rPr>
+              <a:t>git</a:t>
+            </a:r>
+            <a:r>
+              <a:rPr lang="en-US" sz="1600" dirty="0" smtClean="0">
+                <a:latin typeface="Courier New" pitchFamily="49" charset="0"/>
+                <a:cs typeface="Courier New" pitchFamily="49" charset="0"/>
+              </a:rPr>
+              <a:t> </a:t>
+            </a:r>
+            <a:r>
+              <a:rPr lang="en-US" sz="1600" dirty="0" err="1" smtClean="0">
+                <a:latin typeface="Courier New" pitchFamily="49" charset="0"/>
+                <a:cs typeface="Courier New" pitchFamily="49" charset="0"/>
+              </a:rPr>
+              <a:t>config</a:t>
+            </a:r>
+            <a:r>
+              <a:rPr lang="en-US" sz="1600" dirty="0" smtClean="0">
+                <a:latin typeface="Courier New" pitchFamily="49" charset="0"/>
+                <a:cs typeface="Courier New" pitchFamily="49" charset="0"/>
+              </a:rPr>
+              <a:t> --global </a:t>
+            </a:r>
+            <a:r>
+              <a:rPr lang="en-US" sz="1600" dirty="0" err="1" smtClean="0">
+                <a:latin typeface="Courier New" pitchFamily="49" charset="0"/>
+                <a:cs typeface="Courier New" pitchFamily="49" charset="0"/>
+              </a:rPr>
+              <a:t>user.email</a:t>
+            </a:r>
+            <a:r>
+              <a:rPr lang="en-US" sz="1600" dirty="0" smtClean="0">
+                <a:latin typeface="Courier New" pitchFamily="49" charset="0"/>
+                <a:cs typeface="Courier New" pitchFamily="49" charset="0"/>
+              </a:rPr>
+              <a:t> </a:t>
             </a:r>
             <a:r>
               <a:rPr lang="en-US" sz="1600" dirty="0" smtClean="0">
@@ -11043,51 +11068,83 @@
               </a:rPr>
               <a:t>userName@example.com</a:t>
             </a:r>
+            <a:endParaRPr lang="en-US" sz="1600" dirty="0" smtClean="0">
+              <a:latin typeface="Courier New" pitchFamily="49" charset="0"/>
+              <a:cs typeface="Courier New" pitchFamily="49" charset="0"/>
+            </a:endParaRPr>
+          </a:p>
+          <a:p>
+            <a:endParaRPr lang="en-US" sz="1600" dirty="0" smtClean="0">
+              <a:latin typeface="Courier New" pitchFamily="49" charset="0"/>
+              <a:cs typeface="Courier New" pitchFamily="49" charset="0"/>
+            </a:endParaRPr>
+          </a:p>
+          <a:p>
             <a:r>
               <a:rPr lang="en-US" sz="1600" dirty="0" smtClean="0">
                 <a:latin typeface="Courier New" pitchFamily="49" charset="0"/>
                 <a:cs typeface="Courier New" pitchFamily="49" charset="0"/>
               </a:rPr>
-              <a:t> </a:t>
-            </a:r>
-            <a:r>
-              <a:rPr lang="de-DE" sz="1600" dirty="0" smtClean="0">
+              <a:t>$ </a:t>
+            </a:r>
+            <a:r>
+              <a:rPr lang="en-US" sz="1600" dirty="0" err="1" smtClean="0">
                 <a:latin typeface="Courier New" pitchFamily="49" charset="0"/>
                 <a:cs typeface="Courier New" pitchFamily="49" charset="0"/>
               </a:rPr>
-              <a:t>" </a:t>
-            </a:r>
-            <a:r>
-              <a:rPr lang="de-DE" sz="1600" dirty="0" smtClean="0">
+              <a:t>git</a:t>
+            </a:r>
+            <a:r>
+              <a:rPr lang="en-US" sz="1600" dirty="0" smtClean="0">
                 <a:latin typeface="Courier New" pitchFamily="49" charset="0"/>
                 <a:cs typeface="Courier New" pitchFamily="49" charset="0"/>
-                <a:sym typeface="Wingdings 3"/>
-              </a:rPr>
-              <a:t>  </a:t>
-            </a:r>
+              </a:rPr>
+              <a:t> </a:t>
+            </a:r>
+            <a:r>
+              <a:rPr lang="en-US" sz="1600" dirty="0" err="1" smtClean="0">
+                <a:latin typeface="Courier New" pitchFamily="49" charset="0"/>
+                <a:cs typeface="Courier New" pitchFamily="49" charset="0"/>
+              </a:rPr>
+              <a:t>config</a:t>
+            </a:r>
+            <a:r>
+              <a:rPr lang="en-US" sz="1600" dirty="0" smtClean="0">
+                <a:latin typeface="Courier New" pitchFamily="49" charset="0"/>
+                <a:cs typeface="Courier New" pitchFamily="49" charset="0"/>
+              </a:rPr>
+              <a:t> --global </a:t>
+            </a:r>
+            <a:r>
+              <a:rPr lang="en-US" sz="1600" dirty="0" err="1" smtClean="0">
+                <a:latin typeface="Courier New" pitchFamily="49" charset="0"/>
+                <a:cs typeface="Courier New" pitchFamily="49" charset="0"/>
+              </a:rPr>
+              <a:t>github.user</a:t>
+            </a:r>
+            <a:r>
+              <a:rPr lang="en-US" sz="1600" dirty="0" smtClean="0">
+                <a:latin typeface="Courier New" pitchFamily="49" charset="0"/>
+                <a:cs typeface="Courier New" pitchFamily="49" charset="0"/>
+              </a:rPr>
+              <a:t> </a:t>
+            </a:r>
+            <a:r>
+              <a:rPr lang="en-US" sz="1600" i="1" dirty="0" smtClean="0">
+                <a:latin typeface="Courier New" pitchFamily="49" charset="0"/>
+                <a:cs typeface="Courier New" pitchFamily="49" charset="0"/>
+              </a:rPr>
+              <a:t>username</a:t>
+            </a:r>
+            <a:endParaRPr lang="en-US" sz="1600" dirty="0" smtClean="0">
+              <a:latin typeface="Courier New" pitchFamily="49" charset="0"/>
+              <a:cs typeface="Courier New" pitchFamily="49" charset="0"/>
+            </a:endParaRPr>
+          </a:p>
+          <a:p>
             <a:endParaRPr lang="en-US" dirty="0" smtClean="0"/>
           </a:p>
           <a:p>
-            <a:endParaRPr lang="en-US" dirty="0" smtClean="0"/>
-          </a:p>
-          <a:p>
-            <a:r>
-              <a:rPr lang="en-US" dirty="0" smtClean="0"/>
-              <a:t>(Press ‘Enter’ key thrice to skip the passphrase questions)</a:t>
-            </a:r>
-          </a:p>
-          <a:p>
-            <a:pPr>
-              <a:buFontTx/>
-              <a:buChar char="-"/>
-            </a:pPr>
-            <a:endParaRPr lang="en-US" dirty="0" smtClean="0"/>
-          </a:p>
-          <a:p>
-            <a:pPr>
-              <a:buFontTx/>
-              <a:buChar char="-"/>
-            </a:pPr>
             <a:endParaRPr lang="en-US" dirty="0" smtClean="0"/>
           </a:p>
           <a:p>
@@ -11369,7 +11426,7 @@
     </p:spTree>
     <p:extLst>
       <p:ext uri="{BB962C8B-B14F-4D97-AF65-F5344CB8AC3E}">
-        <p14:creationId xmlns:p14="http://schemas.microsoft.com/office/powerpoint/2010/main" xmlns="" val="3160812206"/>
+        <p14:creationId xmlns="" xmlns:p14="http://schemas.microsoft.com/office/powerpoint/2010/main" val="3160812206"/>
       </p:ext>
     </p:extLst>
   </p:cSld>
@@ -13368,7 +13425,7 @@
     </p:spTree>
     <p:extLst>
       <p:ext uri="{BB962C8B-B14F-4D97-AF65-F5344CB8AC3E}">
-        <p14:creationId xmlns:p14="http://schemas.microsoft.com/office/powerpoint/2010/main" xmlns="" val="1795653434"/>
+        <p14:creationId xmlns="" xmlns:p14="http://schemas.microsoft.com/office/powerpoint/2010/main" val="1795653434"/>
       </p:ext>
     </p:extLst>
   </p:cSld>
@@ -13511,7 +13568,7 @@
     </p:spTree>
     <p:extLst>
       <p:ext uri="{BB962C8B-B14F-4D97-AF65-F5344CB8AC3E}">
-        <p14:creationId xmlns:p14="http://schemas.microsoft.com/office/powerpoint/2010/main" xmlns="" val="606890052"/>
+        <p14:creationId xmlns="" xmlns:p14="http://schemas.microsoft.com/office/powerpoint/2010/main" val="606890052"/>
       </p:ext>
     </p:extLst>
   </p:cSld>
@@ -13654,11 +13711,7 @@
           <a:p>
             <a:r>
               <a:rPr lang="en-US" b="1" dirty="0" smtClean="0"/>
-              <a:t>Step 1: Fork the </a:t>
-            </a:r>
-            <a:r>
-              <a:rPr lang="en-US" b="1" dirty="0" smtClean="0"/>
-              <a:t>“</a:t>
+              <a:t>Step 1: Fork the “</a:t>
             </a:r>
             <a:r>
               <a:rPr lang="en-US" b="1" dirty="0" err="1" smtClean="0"/>
@@ -13745,11 +13798,7 @@
           <a:p>
             <a:r>
               <a:rPr lang="en-US" b="1" dirty="0" smtClean="0"/>
-              <a:t>Step 2A: Clone the </a:t>
-            </a:r>
-            <a:r>
-              <a:rPr lang="en-US" b="1" dirty="0" smtClean="0"/>
-              <a:t>“</a:t>
+              <a:t>Step 2A: Clone the “</a:t>
             </a:r>
             <a:r>
               <a:rPr lang="en-US" b="1" dirty="0" err="1" smtClean="0"/>
@@ -13757,11 +13806,7 @@
             </a:r>
             <a:r>
               <a:rPr lang="en-US" b="1" dirty="0" smtClean="0"/>
-              <a:t>” </a:t>
-            </a:r>
-            <a:r>
-              <a:rPr lang="en-US" b="1" dirty="0" smtClean="0"/>
-              <a:t>project</a:t>
+              <a:t>” project</a:t>
             </a:r>
             <a:endParaRPr lang="en-US" dirty="0" smtClean="0"/>
           </a:p>
@@ -14115,66 +14160,6 @@
             </a:r>
           </a:p>
           <a:p>
-            <a:pPr>
-              <a:buFont typeface="Arial" pitchFamily="34" charset="0"/>
-              <a:buChar char="•"/>
-            </a:pPr>
-            <a:endParaRPr lang="en-US" b="1" dirty="0" smtClean="0"/>
-          </a:p>
-          <a:p>
-            <a:pPr>
-              <a:buFont typeface="Arial" pitchFamily="34" charset="0"/>
-              <a:buChar char="•"/>
-            </a:pPr>
-            <a:r>
-              <a:rPr lang="en-US" b="1" dirty="0" err="1" smtClean="0"/>
-              <a:t>Unwatch</a:t>
-            </a:r>
-            <a:r>
-              <a:rPr lang="en-US" b="1" dirty="0" smtClean="0"/>
-              <a:t> the main repo</a:t>
-            </a:r>
-          </a:p>
-          <a:p>
-            <a:pPr>
-              <a:buFont typeface="Arial" pitchFamily="34" charset="0"/>
-              <a:buChar char="•"/>
-            </a:pPr>
-            <a:endParaRPr lang="en-US" b="1" dirty="0" smtClean="0"/>
-          </a:p>
-          <a:p>
-            <a:pPr>
-              <a:buFont typeface="Arial" pitchFamily="34" charset="0"/>
-              <a:buChar char="•"/>
-            </a:pPr>
-            <a:endParaRPr lang="en-US" b="1" dirty="0" smtClean="0"/>
-          </a:p>
-          <a:p>
-            <a:pPr>
-              <a:buFont typeface="Arial" pitchFamily="34" charset="0"/>
-              <a:buChar char="•"/>
-            </a:pPr>
-            <a:endParaRPr lang="en-US" b="1" dirty="0" smtClean="0"/>
-          </a:p>
-          <a:p>
-            <a:pPr>
-              <a:buFont typeface="Arial" pitchFamily="34" charset="0"/>
-              <a:buChar char="•"/>
-            </a:pPr>
-            <a:endParaRPr lang="en-US" b="1" dirty="0" smtClean="0"/>
-          </a:p>
-          <a:p>
-            <a:pPr>
-              <a:buFont typeface="Arial" pitchFamily="34" charset="0"/>
-              <a:buChar char="•"/>
-            </a:pPr>
-            <a:endParaRPr lang="en-US" b="1" dirty="0" smtClean="0"/>
-          </a:p>
-          <a:p>
-            <a:pPr>
-              <a:buFont typeface="Arial" pitchFamily="34" charset="0"/>
-              <a:buChar char="•"/>
-            </a:pPr>
             <a:endParaRPr lang="en-US" b="1" dirty="0" smtClean="0"/>
           </a:p>
           <a:p>
@@ -14288,32 +14273,6 @@
           </a:p>
         </p:txBody>
       </p:sp>
-      <p:pic>
-        <p:nvPicPr>
-          <p:cNvPr id="9" name="Picture 2" descr="Click “Unwatch”"/>
-          <p:cNvPicPr>
-            <a:picLocks noChangeAspect="1" noChangeArrowheads="1"/>
-          </p:cNvPicPr>
-          <p:nvPr/>
-        </p:nvPicPr>
-        <p:blipFill>
-          <a:blip r:embed="rId4" cstate="print"/>
-          <a:srcRect/>
-          <a:stretch>
-            <a:fillRect/>
-          </a:stretch>
-        </p:blipFill>
-        <p:spPr bwMode="auto">
-          <a:xfrm>
-            <a:off x="2857450" y="4356322"/>
-            <a:ext cx="5314950" cy="1304926"/>
-          </a:xfrm>
-          <a:prstGeom prst="rect">
-            <a:avLst/>
-          </a:prstGeom>
-          <a:noFill/>
-        </p:spPr>
-      </p:pic>
     </p:spTree>
   </p:cSld>
   <p:clrMapOvr>
@@ -14923,12 +14882,275 @@
           </a:p>
           <a:p>
             <a:r>
+              <a:rPr lang="en-US" sz="2000" b="1" dirty="0" err="1" smtClean="0">
+                <a:solidFill>
+                  <a:srgbClr val="486DA2"/>
+                </a:solidFill>
+                <a:latin typeface="Verdana" pitchFamily="34" charset="0"/>
+              </a:rPr>
+              <a:t>Git</a:t>
+            </a:r>
+            <a:r>
+              <a:rPr lang="en-US" sz="2000" b="1" dirty="0" smtClean="0">
+                <a:solidFill>
+                  <a:srgbClr val="486DA2"/>
+                </a:solidFill>
+                <a:latin typeface="Verdana" pitchFamily="34" charset="0"/>
+              </a:rPr>
+              <a:t> </a:t>
+            </a:r>
+            <a:r>
+              <a:rPr lang="en-US" sz="2000" b="1" dirty="0" smtClean="0">
+                <a:solidFill>
+                  <a:srgbClr val="486DA2"/>
+                </a:solidFill>
+                <a:latin typeface="Verdana" pitchFamily="34" charset="0"/>
+              </a:rPr>
+              <a:t>Clients</a:t>
+            </a:r>
+            <a:endParaRPr lang="en-US" sz="2000" b="1" dirty="0" smtClean="0">
+              <a:solidFill>
+                <a:srgbClr val="486DA2"/>
+              </a:solidFill>
+              <a:latin typeface="Verdana" pitchFamily="34" charset="0"/>
+            </a:endParaRPr>
+          </a:p>
+          <a:p>
+            <a:endParaRPr lang="en-US" b="1" u="sng" dirty="0" smtClean="0">
+              <a:solidFill>
+                <a:srgbClr val="486DA2"/>
+              </a:solidFill>
+              <a:latin typeface="Verdana" pitchFamily="34" charset="0"/>
+            </a:endParaRPr>
+          </a:p>
+          <a:p>
+            <a:r>
+              <a:rPr lang="en-US" b="1" u="sng" dirty="0" smtClean="0">
+                <a:solidFill>
+                  <a:srgbClr val="486DA2"/>
+                </a:solidFill>
+                <a:latin typeface="Verdana" pitchFamily="34" charset="0"/>
+              </a:rPr>
+              <a:t>MAC</a:t>
+            </a:r>
+            <a:endParaRPr lang="en-US" b="1" dirty="0" smtClean="0">
+              <a:solidFill>
+                <a:srgbClr val="486DA2"/>
+              </a:solidFill>
+              <a:latin typeface="Verdana" pitchFamily="34" charset="0"/>
+            </a:endParaRPr>
+          </a:p>
+          <a:p>
+            <a:r>
               <a:rPr lang="en-US" b="1" dirty="0" err="1" smtClean="0">
                 <a:solidFill>
                   <a:srgbClr val="486DA2"/>
                 </a:solidFill>
                 <a:latin typeface="Verdana" pitchFamily="34" charset="0"/>
               </a:rPr>
+              <a:t>Gitti</a:t>
+            </a:r>
+            <a:r>
+              <a:rPr lang="en-US" b="1" dirty="0" smtClean="0">
+                <a:solidFill>
+                  <a:srgbClr val="486DA2"/>
+                </a:solidFill>
+                <a:latin typeface="Verdana" pitchFamily="34" charset="0"/>
+              </a:rPr>
+              <a:t> - </a:t>
+            </a:r>
+            <a:r>
+              <a:rPr lang="en-US" dirty="0" smtClean="0">
+                <a:hlinkClick r:id="rId4"/>
+              </a:rPr>
+              <a:t>http://www.gittiapp.com/</a:t>
+            </a:r>
+            <a:endParaRPr lang="en-US" b="1" dirty="0" smtClean="0">
+              <a:solidFill>
+                <a:srgbClr val="486DA2"/>
+              </a:solidFill>
+              <a:latin typeface="Verdana" pitchFamily="34" charset="0"/>
+            </a:endParaRPr>
+          </a:p>
+          <a:p>
+            <a:r>
+              <a:rPr lang="en-US" b="1" dirty="0" err="1" smtClean="0">
+                <a:solidFill>
+                  <a:srgbClr val="486DA2"/>
+                </a:solidFill>
+                <a:latin typeface="Verdana" pitchFamily="34" charset="0"/>
+              </a:rPr>
+              <a:t>Atlassian</a:t>
+            </a:r>
+            <a:r>
+              <a:rPr lang="en-US" b="1" dirty="0" smtClean="0">
+                <a:solidFill>
+                  <a:srgbClr val="486DA2"/>
+                </a:solidFill>
+                <a:latin typeface="Verdana" pitchFamily="34" charset="0"/>
+              </a:rPr>
+              <a:t> </a:t>
+            </a:r>
+            <a:r>
+              <a:rPr lang="en-US" b="1" dirty="0" smtClean="0">
+                <a:solidFill>
+                  <a:srgbClr val="486DA2"/>
+                </a:solidFill>
+                <a:latin typeface="Verdana" pitchFamily="34" charset="0"/>
+              </a:rPr>
+              <a:t>Source Tree - </a:t>
+            </a:r>
+            <a:r>
+              <a:rPr lang="en-US" b="1" dirty="0" smtClean="0">
+                <a:solidFill>
+                  <a:srgbClr val="486DA2"/>
+                </a:solidFill>
+                <a:latin typeface="Verdana" pitchFamily="34" charset="0"/>
+                <a:hlinkClick r:id="rId5"/>
+              </a:rPr>
+              <a:t>www.sourcetreeapp.com</a:t>
+            </a:r>
+            <a:endParaRPr lang="en-US" b="1" dirty="0" smtClean="0">
+              <a:solidFill>
+                <a:srgbClr val="486DA2"/>
+              </a:solidFill>
+              <a:latin typeface="Verdana" pitchFamily="34" charset="0"/>
+            </a:endParaRPr>
+          </a:p>
+          <a:p>
+            <a:r>
+              <a:rPr lang="en-US" b="1" dirty="0" smtClean="0">
+                <a:solidFill>
+                  <a:srgbClr val="486DA2"/>
+                </a:solidFill>
+                <a:latin typeface="Verdana" pitchFamily="34" charset="0"/>
+              </a:rPr>
+              <a:t>Tower (Commercial) - </a:t>
+            </a:r>
+            <a:r>
+              <a:rPr lang="en-US" dirty="0" smtClean="0">
+                <a:hlinkClick r:id="rId6"/>
+              </a:rPr>
+              <a:t>http://www.git-tower.com</a:t>
+            </a:r>
+            <a:r>
+              <a:rPr lang="en-US" dirty="0" smtClean="0">
+                <a:hlinkClick r:id="rId6"/>
+              </a:rPr>
+              <a:t>/</a:t>
+            </a:r>
+            <a:endParaRPr lang="en-US" dirty="0" smtClean="0"/>
+          </a:p>
+          <a:p>
+            <a:r>
+              <a:rPr lang="en-US" b="1" dirty="0" smtClean="0">
+                <a:solidFill>
+                  <a:srgbClr val="486DA2"/>
+                </a:solidFill>
+                <a:latin typeface="Verdana" pitchFamily="34" charset="0"/>
+              </a:rPr>
+              <a:t>Smart </a:t>
+            </a:r>
+            <a:r>
+              <a:rPr lang="en-US" b="1" dirty="0" err="1" smtClean="0">
+                <a:solidFill>
+                  <a:srgbClr val="486DA2"/>
+                </a:solidFill>
+                <a:latin typeface="Verdana" pitchFamily="34" charset="0"/>
+              </a:rPr>
+              <a:t>git</a:t>
+            </a:r>
+            <a:r>
+              <a:rPr lang="en-US" b="1" dirty="0" smtClean="0">
+                <a:solidFill>
+                  <a:srgbClr val="486DA2"/>
+                </a:solidFill>
+                <a:latin typeface="Verdana" pitchFamily="34" charset="0"/>
+              </a:rPr>
+              <a:t> (Commercial) - </a:t>
+            </a:r>
+            <a:r>
+              <a:rPr lang="en-US" dirty="0" smtClean="0">
+                <a:hlinkClick r:id="rId7"/>
+              </a:rPr>
+              <a:t>http://</a:t>
+            </a:r>
+            <a:r>
+              <a:rPr lang="en-US" dirty="0" smtClean="0">
+                <a:hlinkClick r:id="rId7"/>
+              </a:rPr>
+              <a:t>www.syntevo.com/smartgit/index.html</a:t>
+            </a:r>
+            <a:endParaRPr lang="en-US" dirty="0" smtClean="0"/>
+          </a:p>
+          <a:p>
+            <a:r>
+              <a:rPr lang="en-US" b="1" dirty="0" err="1" smtClean="0">
+                <a:solidFill>
+                  <a:srgbClr val="486DA2"/>
+                </a:solidFill>
+                <a:latin typeface="Verdana" pitchFamily="34" charset="0"/>
+              </a:rPr>
+              <a:t>GitX</a:t>
+            </a:r>
+            <a:r>
+              <a:rPr lang="en-US" b="1" dirty="0" smtClean="0">
+                <a:solidFill>
+                  <a:srgbClr val="486DA2"/>
+                </a:solidFill>
+                <a:latin typeface="Verdana" pitchFamily="34" charset="0"/>
+              </a:rPr>
+              <a:t> - </a:t>
+            </a:r>
+            <a:r>
+              <a:rPr lang="en-US" dirty="0" smtClean="0">
+                <a:hlinkClick r:id="rId8"/>
+              </a:rPr>
+              <a:t>http://gitx.frim.nl/</a:t>
+            </a:r>
+            <a:endParaRPr lang="en-US" b="1" dirty="0" smtClean="0">
+              <a:solidFill>
+                <a:srgbClr val="486DA2"/>
+              </a:solidFill>
+              <a:latin typeface="Verdana" pitchFamily="34" charset="0"/>
+            </a:endParaRPr>
+          </a:p>
+          <a:p>
+            <a:endParaRPr lang="en-US" b="1" u="sng" dirty="0" smtClean="0">
+              <a:solidFill>
+                <a:srgbClr val="486DA2"/>
+              </a:solidFill>
+              <a:latin typeface="Verdana" pitchFamily="34" charset="0"/>
+            </a:endParaRPr>
+          </a:p>
+          <a:p>
+            <a:r>
+              <a:rPr lang="en-US" b="1" u="sng" dirty="0" smtClean="0">
+                <a:solidFill>
+                  <a:srgbClr val="486DA2"/>
+                </a:solidFill>
+                <a:latin typeface="Verdana" pitchFamily="34" charset="0"/>
+              </a:rPr>
+              <a:t>Windows</a:t>
+            </a:r>
+          </a:p>
+          <a:p>
+            <a:r>
+              <a:rPr lang="en-US" b="1" dirty="0" smtClean="0">
+                <a:solidFill>
+                  <a:srgbClr val="486DA2"/>
+                </a:solidFill>
+                <a:latin typeface="Verdana" pitchFamily="34" charset="0"/>
+              </a:rPr>
+              <a:t>Tortoise </a:t>
+            </a:r>
+            <a:r>
+              <a:rPr lang="en-US" b="1" dirty="0" err="1" smtClean="0">
+                <a:solidFill>
+                  <a:srgbClr val="486DA2"/>
+                </a:solidFill>
+                <a:latin typeface="Verdana" pitchFamily="34" charset="0"/>
+              </a:rPr>
               <a:t>Git</a:t>
             </a:r>
             <a:r>
@@ -14938,8 +15160,106 @@
                 </a:solidFill>
                 <a:latin typeface="Verdana" pitchFamily="34" charset="0"/>
               </a:rPr>
-              <a:t> Clients</a:t>
-            </a:r>
+              <a:t> - </a:t>
+            </a:r>
+            <a:r>
+              <a:rPr lang="en-US" dirty="0" smtClean="0">
+                <a:hlinkClick r:id="rId9"/>
+              </a:rPr>
+              <a:t>http://code.google.com/p/tortoisegit</a:t>
+            </a:r>
+            <a:r>
+              <a:rPr lang="en-US" dirty="0" smtClean="0">
+                <a:hlinkClick r:id="rId9"/>
+              </a:rPr>
+              <a:t>/</a:t>
+            </a:r>
+            <a:endParaRPr lang="en-US" dirty="0" smtClean="0"/>
+          </a:p>
+          <a:p>
+            <a:r>
+              <a:rPr lang="en-US" b="1" dirty="0" err="1" smtClean="0">
+                <a:solidFill>
+                  <a:srgbClr val="486DA2"/>
+                </a:solidFill>
+                <a:latin typeface="Verdana" pitchFamily="34" charset="0"/>
+              </a:rPr>
+              <a:t>Git</a:t>
+            </a:r>
+            <a:r>
+              <a:rPr lang="en-US" b="1" dirty="0" smtClean="0">
+                <a:solidFill>
+                  <a:srgbClr val="486DA2"/>
+                </a:solidFill>
+                <a:latin typeface="Verdana" pitchFamily="34" charset="0"/>
+              </a:rPr>
+              <a:t> Extension - </a:t>
+            </a:r>
+            <a:r>
+              <a:rPr lang="en-US" dirty="0" smtClean="0">
+                <a:hlinkClick r:id="rId10"/>
+              </a:rPr>
+              <a:t>http://code.google.com/p/gitextensions</a:t>
+            </a:r>
+            <a:r>
+              <a:rPr lang="en-US" dirty="0" smtClean="0">
+                <a:hlinkClick r:id="rId10"/>
+              </a:rPr>
+              <a:t>/</a:t>
+            </a:r>
+            <a:endParaRPr lang="en-US" dirty="0" smtClean="0"/>
+          </a:p>
+          <a:p>
+            <a:r>
+              <a:rPr lang="en-US" b="1" dirty="0" smtClean="0">
+                <a:solidFill>
+                  <a:srgbClr val="486DA2"/>
+                </a:solidFill>
+                <a:latin typeface="Verdana" pitchFamily="34" charset="0"/>
+              </a:rPr>
+              <a:t>Smart </a:t>
+            </a:r>
+            <a:r>
+              <a:rPr lang="en-US" b="1" dirty="0" err="1" smtClean="0">
+                <a:solidFill>
+                  <a:srgbClr val="486DA2"/>
+                </a:solidFill>
+                <a:latin typeface="Verdana" pitchFamily="34" charset="0"/>
+              </a:rPr>
+              <a:t>git</a:t>
+            </a:r>
+            <a:r>
+              <a:rPr lang="en-US" b="1" dirty="0" smtClean="0">
+                <a:solidFill>
+                  <a:srgbClr val="486DA2"/>
+                </a:solidFill>
+                <a:latin typeface="Verdana" pitchFamily="34" charset="0"/>
+              </a:rPr>
+              <a:t> (Commercial) - </a:t>
+            </a:r>
+            <a:r>
+              <a:rPr lang="en-US" dirty="0" smtClean="0">
+                <a:hlinkClick r:id="rId7"/>
+              </a:rPr>
+              <a:t>http://www.syntevo.com/smartgit/index.html</a:t>
+            </a:r>
+            <a:endParaRPr lang="en-US" dirty="0" smtClean="0"/>
+          </a:p>
+          <a:p>
+            <a:endParaRPr lang="en-US" b="1" dirty="0" smtClean="0">
+              <a:solidFill>
+                <a:srgbClr val="486DA2"/>
+              </a:solidFill>
+              <a:latin typeface="Verdana" pitchFamily="34" charset="0"/>
+            </a:endParaRPr>
+          </a:p>
+          <a:p>
+            <a:endParaRPr lang="en-US" b="1" dirty="0" smtClean="0">
+              <a:solidFill>
+                <a:srgbClr val="486DA2"/>
+              </a:solidFill>
+              <a:latin typeface="Verdana" pitchFamily="34" charset="0"/>
+            </a:endParaRPr>
           </a:p>
           <a:p>
             <a:endParaRPr lang="en-US" b="1" dirty="0">
@@ -15518,7 +15838,7 @@
           <a:blip r:embed="rId9" cstate="print">
             <a:extLst>
               <a:ext uri="{28A0092B-C50C-407E-A947-70E740481C1C}">
-                <a14:useLocalDpi xmlns:a14="http://schemas.microsoft.com/office/drawing/2010/main" xmlns="" val="0"/>
+                <a14:useLocalDpi xmlns="" xmlns:a14="http://schemas.microsoft.com/office/drawing/2010/main" val="0"/>
               </a:ext>
             </a:extLst>
           </a:blip>

</xml_diff>